<commit_message>
Cut down number of words
</commit_message>
<xml_diff>
--- a/SPS_poster.pptx
+++ b/SPS_poster.pptx
@@ -243,7 +243,7 @@
           <a:p>
             <a:fld id="{F5C80084-763D-4498-A258-712F6EA6F5AD}" type="datetimeFigureOut">
               <a:rPr lang="en-US" smtClean="0"/>
-              <a:t>4/22/2021</a:t>
+              <a:t>4/26/2021</a:t>
             </a:fld>
             <a:endParaRPr lang="en-US"/>
           </a:p>
@@ -413,7 +413,7 @@
           <a:p>
             <a:fld id="{F5C80084-763D-4498-A258-712F6EA6F5AD}" type="datetimeFigureOut">
               <a:rPr lang="en-US" smtClean="0"/>
-              <a:t>4/22/2021</a:t>
+              <a:t>4/26/2021</a:t>
             </a:fld>
             <a:endParaRPr lang="en-US"/>
           </a:p>
@@ -593,7 +593,7 @@
           <a:p>
             <a:fld id="{F5C80084-763D-4498-A258-712F6EA6F5AD}" type="datetimeFigureOut">
               <a:rPr lang="en-US" smtClean="0"/>
-              <a:t>4/22/2021</a:t>
+              <a:t>4/26/2021</a:t>
             </a:fld>
             <a:endParaRPr lang="en-US"/>
           </a:p>
@@ -763,7 +763,7 @@
           <a:p>
             <a:fld id="{F5C80084-763D-4498-A258-712F6EA6F5AD}" type="datetimeFigureOut">
               <a:rPr lang="en-US" smtClean="0"/>
-              <a:t>4/22/2021</a:t>
+              <a:t>4/26/2021</a:t>
             </a:fld>
             <a:endParaRPr lang="en-US"/>
           </a:p>
@@ -1007,7 +1007,7 @@
           <a:p>
             <a:fld id="{F5C80084-763D-4498-A258-712F6EA6F5AD}" type="datetimeFigureOut">
               <a:rPr lang="en-US" smtClean="0"/>
-              <a:t>4/22/2021</a:t>
+              <a:t>4/26/2021</a:t>
             </a:fld>
             <a:endParaRPr lang="en-US"/>
           </a:p>
@@ -1239,7 +1239,7 @@
           <a:p>
             <a:fld id="{F5C80084-763D-4498-A258-712F6EA6F5AD}" type="datetimeFigureOut">
               <a:rPr lang="en-US" smtClean="0"/>
-              <a:t>4/22/2021</a:t>
+              <a:t>4/26/2021</a:t>
             </a:fld>
             <a:endParaRPr lang="en-US"/>
           </a:p>
@@ -1606,7 +1606,7 @@
           <a:p>
             <a:fld id="{F5C80084-763D-4498-A258-712F6EA6F5AD}" type="datetimeFigureOut">
               <a:rPr lang="en-US" smtClean="0"/>
-              <a:t>4/22/2021</a:t>
+              <a:t>4/26/2021</a:t>
             </a:fld>
             <a:endParaRPr lang="en-US"/>
           </a:p>
@@ -1724,7 +1724,7 @@
           <a:p>
             <a:fld id="{F5C80084-763D-4498-A258-712F6EA6F5AD}" type="datetimeFigureOut">
               <a:rPr lang="en-US" smtClean="0"/>
-              <a:t>4/22/2021</a:t>
+              <a:t>4/26/2021</a:t>
             </a:fld>
             <a:endParaRPr lang="en-US"/>
           </a:p>
@@ -1819,7 +1819,7 @@
           <a:p>
             <a:fld id="{F5C80084-763D-4498-A258-712F6EA6F5AD}" type="datetimeFigureOut">
               <a:rPr lang="en-US" smtClean="0"/>
-              <a:t>4/22/2021</a:t>
+              <a:t>4/26/2021</a:t>
             </a:fld>
             <a:endParaRPr lang="en-US"/>
           </a:p>
@@ -2096,7 +2096,7 @@
           <a:p>
             <a:fld id="{F5C80084-763D-4498-A258-712F6EA6F5AD}" type="datetimeFigureOut">
               <a:rPr lang="en-US" smtClean="0"/>
-              <a:t>4/22/2021</a:t>
+              <a:t>4/26/2021</a:t>
             </a:fld>
             <a:endParaRPr lang="en-US"/>
           </a:p>
@@ -2353,7 +2353,7 @@
           <a:p>
             <a:fld id="{F5C80084-763D-4498-A258-712F6EA6F5AD}" type="datetimeFigureOut">
               <a:rPr lang="en-US" smtClean="0"/>
-              <a:t>4/22/2021</a:t>
+              <a:t>4/26/2021</a:t>
             </a:fld>
             <a:endParaRPr lang="en-US"/>
           </a:p>
@@ -2566,7 +2566,7 @@
           <a:p>
             <a:fld id="{F5C80084-763D-4498-A258-712F6EA6F5AD}" type="datetimeFigureOut">
               <a:rPr lang="en-US" smtClean="0"/>
-              <a:t>4/22/2021</a:t>
+              <a:t>4/26/2021</a:t>
             </a:fld>
             <a:endParaRPr lang="en-US"/>
           </a:p>
@@ -2971,6 +2971,112 @@
           <a:chExt cx="0" cy="0"/>
         </a:xfrm>
       </p:grpSpPr>
+      <p:grpSp>
+        <p:nvGrpSpPr>
+          <p:cNvPr id="23" name="Group 22">
+            <a:extLst>
+              <a:ext uri="{FF2B5EF4-FFF2-40B4-BE49-F238E27FC236}">
+                <a16:creationId xmlns:a16="http://schemas.microsoft.com/office/drawing/2014/main" id="{9E3D91B3-4708-48F1-9024-654F4FFA7D4E}"/>
+              </a:ext>
+            </a:extLst>
+          </p:cNvPr>
+          <p:cNvGrpSpPr/>
+          <p:nvPr/>
+        </p:nvGrpSpPr>
+        <p:grpSpPr>
+          <a:xfrm>
+            <a:off x="10886945" y="11006280"/>
+            <a:ext cx="7019925" cy="3229760"/>
+            <a:chOff x="29521553" y="14462840"/>
+            <a:chExt cx="7019925" cy="3229760"/>
+          </a:xfrm>
+        </p:grpSpPr>
+        <p:pic>
+          <p:nvPicPr>
+            <p:cNvPr id="1062" name="Picture 38">
+              <a:extLst>
+                <a:ext uri="{FF2B5EF4-FFF2-40B4-BE49-F238E27FC236}">
+                  <a16:creationId xmlns:a16="http://schemas.microsoft.com/office/drawing/2014/main" id="{674BC305-66A5-4DCE-A304-FD941AF3B594}"/>
+                </a:ext>
+              </a:extLst>
+            </p:cNvPr>
+            <p:cNvPicPr>
+              <a:picLocks noChangeAspect="1" noChangeArrowheads="1"/>
+            </p:cNvPicPr>
+            <p:nvPr/>
+          </p:nvPicPr>
+          <p:blipFill>
+            <a:blip r:embed="rId2">
+              <a:extLst>
+                <a:ext uri="{28A0092B-C50C-407E-A947-70E740481C1C}">
+                  <a14:useLocalDpi xmlns:a14="http://schemas.microsoft.com/office/drawing/2010/main" val="0"/>
+                </a:ext>
+              </a:extLst>
+            </a:blip>
+            <a:srcRect/>
+            <a:stretch>
+              <a:fillRect/>
+            </a:stretch>
+          </p:blipFill>
+          <p:spPr bwMode="auto">
+            <a:xfrm>
+              <a:off x="29521553" y="14462840"/>
+              <a:ext cx="7019925" cy="2447925"/>
+            </a:xfrm>
+            <a:prstGeom prst="rect">
+              <a:avLst/>
+            </a:prstGeom>
+            <a:noFill/>
+            <a:extLst>
+              <a:ext uri="{909E8E84-426E-40DD-AFC4-6F175D3DCCD1}">
+                <a14:hiddenFill xmlns:a14="http://schemas.microsoft.com/office/drawing/2010/main">
+                  <a:solidFill>
+                    <a:srgbClr val="FFFFFF"/>
+                  </a:solidFill>
+                </a14:hiddenFill>
+              </a:ext>
+            </a:extLst>
+          </p:spPr>
+        </p:pic>
+        <p:sp>
+          <p:nvSpPr>
+            <p:cNvPr id="74" name="TextBox 73">
+              <a:extLst>
+                <a:ext uri="{FF2B5EF4-FFF2-40B4-BE49-F238E27FC236}">
+                  <a16:creationId xmlns:a16="http://schemas.microsoft.com/office/drawing/2014/main" id="{B63CB55E-66D6-4354-A4F5-0A8F888F9340}"/>
+                </a:ext>
+              </a:extLst>
+            </p:cNvPr>
+            <p:cNvSpPr txBox="1"/>
+            <p:nvPr/>
+          </p:nvSpPr>
+          <p:spPr>
+            <a:xfrm>
+              <a:off x="30621156" y="17046269"/>
+              <a:ext cx="5124264" cy="646331"/>
+            </a:xfrm>
+            <a:prstGeom prst="rect">
+              <a:avLst/>
+            </a:prstGeom>
+            <a:noFill/>
+          </p:spPr>
+          <p:txBody>
+            <a:bodyPr wrap="square" rtlCol="0">
+              <a:spAutoFit/>
+            </a:bodyPr>
+            <a:lstStyle/>
+            <a:p>
+              <a:r>
+                <a:rPr lang="en-US" dirty="0">
+                  <a:latin typeface="Source Sans Pro" panose="020B0503030403020204" pitchFamily="34" charset="0"/>
+                  <a:ea typeface="Source Sans Pro" panose="020B0503030403020204" pitchFamily="34" charset="0"/>
+                </a:rPr>
+                <a:t>FIG. 12. Block diagram of Weather Clock components</a:t>
+              </a:r>
+            </a:p>
+          </p:txBody>
+        </p:sp>
+      </p:grpSp>
       <p:sp>
         <p:nvSpPr>
           <p:cNvPr id="4" name="TextBox 3">
@@ -3187,7 +3293,7 @@
           <p:nvPr/>
         </p:nvPicPr>
         <p:blipFill>
-          <a:blip r:embed="rId2">
+          <a:blip r:embed="rId3">
             <a:extLst>
               <a:ext uri="{28A0092B-C50C-407E-A947-70E740481C1C}">
                 <a14:useLocalDpi xmlns:a14="http://schemas.microsoft.com/office/drawing/2010/main" val="0"/>
@@ -3234,7 +3340,7 @@
           <p:nvPr/>
         </p:nvPicPr>
         <p:blipFill>
-          <a:blip r:embed="rId3">
+          <a:blip r:embed="rId4">
             <a:extLst>
               <a:ext uri="{28A0092B-C50C-407E-A947-70E740481C1C}">
                 <a14:useLocalDpi xmlns:a14="http://schemas.microsoft.com/office/drawing/2010/main" val="0"/>
@@ -3281,7 +3387,7 @@
           <p:nvPr/>
         </p:nvPicPr>
         <p:blipFill rotWithShape="1">
-          <a:blip r:embed="rId4">
+          <a:blip r:embed="rId5">
             <a:extLst>
               <a:ext uri="{28A0092B-C50C-407E-A947-70E740481C1C}">
                 <a14:useLocalDpi xmlns:a14="http://schemas.microsoft.com/office/drawing/2010/main" val="0"/>
@@ -3666,7 +3772,7 @@
                 <a:latin typeface="Source Sans Pro" panose="020B0503030403020204" pitchFamily="34" charset="0"/>
                 <a:ea typeface="Source Sans Pro" panose="020B0503030403020204" pitchFamily="34" charset="0"/>
               </a:rPr>
-              <a:t>I enjoyed the process I went through to create this weather clock. Along the way I would say I learned a great deal about many things. I learned a lot about how microcontrollers work and how they interface with other electronics I learned a lot about different types of batteries. I got the basics of PCB design and would now say I am capable of creating simple boards. In topics less related to physics I learned more about software and how to work on the programming of microcontrollers. I gained more experience in mechanical design and outsourcing the creation of my designs. I also became better at documenting my work. I enjoy creating things. This project was a good learning experience for me, and I am happy with the end product.</a:t>
+              <a:t>I enjoyed the process I went through to create this weather clock. Along the way I would say I learned a great deal about many things. I learned a lot about how microcontrollers work and how they interface with other electronics I learned a lot about different types of batteries. I got the basics of PCB design and would now say I can create simple boards. In topics less related to physics I learned more about software and how to work on the programming of microcontrollers. I gained more experience in mechanical design and outsourcing the creation of my designs. I also became better at documenting my work. I enjoy creating things. This project was a good learning experience for me, and I am happy with the product.</a:t>
             </a:r>
           </a:p>
         </p:txBody>
@@ -3686,7 +3792,7 @@
         <p:spPr>
           <a:xfrm>
             <a:off x="11267584" y="4822917"/>
-            <a:ext cx="7699953" cy="6001643"/>
+            <a:ext cx="5888745" cy="6370975"/>
           </a:xfrm>
           <a:prstGeom prst="rect">
             <a:avLst/>
@@ -3732,24 +3838,27 @@
                 <a:latin typeface="Source Sans Pro" panose="020B0503030403020204" pitchFamily="34" charset="0"/>
                 <a:ea typeface="Source Sans Pro" panose="020B0503030403020204" pitchFamily="34" charset="0"/>
               </a:rPr>
-              <a:t>Advantages</a:t>
-            </a:r>
-          </a:p>
-          <a:p>
-            <a:pPr marL="1257300" lvl="2" indent="-342900">
-              <a:buFont typeface="Arial" panose="020B0604020202020204" pitchFamily="34" charset="0"/>
-              <a:buChar char="•"/>
-            </a:pPr>
+              <a:t>Pixels are small capsules filled with negatively changed white pigment and positively charged white pigment. A charge is applied to move the pigment and change the pixel.</a:t>
+            </a:r>
+          </a:p>
+          <a:p>
+            <a:pPr lvl="1"/>
+            <a:endParaRPr lang="en-US" sz="2400" dirty="0">
+              <a:latin typeface="Source Sans Pro" panose="020B0503030403020204" pitchFamily="34" charset="0"/>
+              <a:ea typeface="Source Sans Pro" panose="020B0503030403020204" pitchFamily="34" charset="0"/>
+            </a:endParaRPr>
+          </a:p>
+          <a:p>
             <a:r>
               <a:rPr lang="en-US" sz="2400" dirty="0">
                 <a:latin typeface="Source Sans Pro" panose="020B0503030403020204" pitchFamily="34" charset="0"/>
                 <a:ea typeface="Source Sans Pro" panose="020B0503030403020204" pitchFamily="34" charset="0"/>
               </a:rPr>
-              <a:t>Paper like display without glare</a:t>
-            </a:r>
-          </a:p>
-          <a:p>
-            <a:pPr marL="1257300" lvl="2" indent="-342900">
+              <a:t>Esp32:</a:t>
+            </a:r>
+          </a:p>
+          <a:p>
+            <a:pPr marL="800100" lvl="1" indent="-342900">
               <a:buFont typeface="Arial" panose="020B0604020202020204" pitchFamily="34" charset="0"/>
               <a:buChar char="•"/>
             </a:pPr>
@@ -3758,85 +3867,7 @@
                 <a:latin typeface="Source Sans Pro" panose="020B0503030403020204" pitchFamily="34" charset="0"/>
                 <a:ea typeface="Source Sans Pro" panose="020B0503030403020204" pitchFamily="34" charset="0"/>
               </a:rPr>
-              <a:t>Have a very low power consumption</a:t>
-            </a:r>
-          </a:p>
-          <a:p>
-            <a:pPr marL="1257300" lvl="2" indent="-342900">
-              <a:buFont typeface="Arial" panose="020B0604020202020204" pitchFamily="34" charset="0"/>
-              <a:buChar char="•"/>
-            </a:pPr>
-            <a:r>
-              <a:rPr lang="en-US" sz="2400" dirty="0">
-                <a:latin typeface="Source Sans Pro" panose="020B0503030403020204" pitchFamily="34" charset="0"/>
-                <a:ea typeface="Source Sans Pro" panose="020B0503030403020204" pitchFamily="34" charset="0"/>
-              </a:rPr>
-              <a:t>Retain an image without power</a:t>
-            </a:r>
-          </a:p>
-          <a:p>
-            <a:pPr marL="800100" lvl="1" indent="-342900">
-              <a:buFont typeface="Arial" panose="020B0604020202020204" pitchFamily="34" charset="0"/>
-              <a:buChar char="•"/>
-            </a:pPr>
-            <a:r>
-              <a:rPr lang="en-US" sz="2400" dirty="0">
-                <a:latin typeface="Source Sans Pro" panose="020B0503030403020204" pitchFamily="34" charset="0"/>
-                <a:ea typeface="Source Sans Pro" panose="020B0503030403020204" pitchFamily="34" charset="0"/>
-              </a:rPr>
-              <a:t>Disadvantages</a:t>
-            </a:r>
-          </a:p>
-          <a:p>
-            <a:pPr marL="1257300" lvl="2" indent="-342900">
-              <a:buFont typeface="Arial" panose="020B0604020202020204" pitchFamily="34" charset="0"/>
-              <a:buChar char="•"/>
-            </a:pPr>
-            <a:r>
-              <a:rPr lang="en-US" sz="2400" dirty="0">
-                <a:latin typeface="Source Sans Pro" panose="020B0503030403020204" pitchFamily="34" charset="0"/>
-                <a:ea typeface="Source Sans Pro" panose="020B0503030403020204" pitchFamily="34" charset="0"/>
-              </a:rPr>
-              <a:t>Slow refresh rate</a:t>
-            </a:r>
-          </a:p>
-          <a:p>
-            <a:pPr marL="1257300" lvl="2" indent="-342900">
-              <a:buFont typeface="Arial" panose="020B0604020202020204" pitchFamily="34" charset="0"/>
-              <a:buChar char="•"/>
-            </a:pPr>
-            <a:r>
-              <a:rPr lang="en-US" sz="2400" dirty="0">
-                <a:latin typeface="Source Sans Pro" panose="020B0503030403020204" pitchFamily="34" charset="0"/>
-                <a:ea typeface="Source Sans Pro" panose="020B0503030403020204" pitchFamily="34" charset="0"/>
-              </a:rPr>
-              <a:t>Limited colors</a:t>
-            </a:r>
-          </a:p>
-          <a:p>
-            <a:pPr marL="800100" lvl="1" indent="-342900">
-              <a:buFont typeface="Arial" panose="020B0604020202020204" pitchFamily="34" charset="0"/>
-              <a:buChar char="•"/>
-            </a:pPr>
-            <a:r>
-              <a:rPr lang="en-US" sz="2400" dirty="0">
-                <a:latin typeface="Source Sans Pro" panose="020B0503030403020204" pitchFamily="34" charset="0"/>
-                <a:ea typeface="Source Sans Pro" panose="020B0503030403020204" pitchFamily="34" charset="0"/>
-              </a:rPr>
-              <a:t>Workings</a:t>
-            </a:r>
-          </a:p>
-          <a:p>
-            <a:pPr marL="1257300" lvl="2" indent="-342900">
-              <a:buFont typeface="Arial" panose="020B0604020202020204" pitchFamily="34" charset="0"/>
-              <a:buChar char="•"/>
-            </a:pPr>
-            <a:r>
-              <a:rPr lang="en-US" sz="2400" dirty="0">
-                <a:latin typeface="Source Sans Pro" panose="020B0503030403020204" pitchFamily="34" charset="0"/>
-                <a:ea typeface="Source Sans Pro" panose="020B0503030403020204" pitchFamily="34" charset="0"/>
-              </a:rPr>
-              <a:t>Pixels are small capsules filled with negatively changed white pigment and positively charged white pigment. A charge is applied to move the pigment and change the pixel.</a:t>
+              <a:t>The small development board consisted of a programmable micro-controller, a Wi-Fi/Bluetooth module and other features. Also included are many GPIO pins.</a:t>
             </a:r>
           </a:p>
         </p:txBody>
@@ -3991,145 +4022,6 @@
       </p:sp>
       <p:sp>
         <p:nvSpPr>
-          <p:cNvPr id="45" name="TextBox 44">
-            <a:extLst>
-              <a:ext uri="{FF2B5EF4-FFF2-40B4-BE49-F238E27FC236}">
-                <a16:creationId xmlns:a16="http://schemas.microsoft.com/office/drawing/2014/main" id="{B50E36CB-3D19-4B6B-87A5-C25B7981226C}"/>
-              </a:ext>
-            </a:extLst>
-          </p:cNvPr>
-          <p:cNvSpPr txBox="1"/>
-          <p:nvPr/>
-        </p:nvSpPr>
-        <p:spPr>
-          <a:xfrm>
-            <a:off x="11178372" y="10976603"/>
-            <a:ext cx="12564989" cy="3785652"/>
-          </a:xfrm>
-          <a:prstGeom prst="rect">
-            <a:avLst/>
-          </a:prstGeom>
-          <a:noFill/>
-        </p:spPr>
-        <p:txBody>
-          <a:bodyPr wrap="square" rtlCol="0">
-            <a:spAutoFit/>
-          </a:bodyPr>
-          <a:lstStyle/>
-          <a:p>
-            <a:r>
-              <a:rPr lang="en-US" sz="2400" dirty="0">
-                <a:latin typeface="Source Sans Pro" panose="020B0503030403020204" pitchFamily="34" charset="0"/>
-                <a:ea typeface="Source Sans Pro" panose="020B0503030403020204" pitchFamily="34" charset="0"/>
-              </a:rPr>
-              <a:t>Esp32:</a:t>
-            </a:r>
-          </a:p>
-          <a:p>
-            <a:pPr marL="800100" lvl="1" indent="-342900">
-              <a:buFont typeface="Arial" panose="020B0604020202020204" pitchFamily="34" charset="0"/>
-              <a:buChar char="•"/>
-            </a:pPr>
-            <a:r>
-              <a:rPr lang="en-US" sz="2400" dirty="0">
-                <a:latin typeface="Source Sans Pro" panose="020B0503030403020204" pitchFamily="34" charset="0"/>
-                <a:ea typeface="Source Sans Pro" panose="020B0503030403020204" pitchFamily="34" charset="0"/>
-              </a:rPr>
-              <a:t>Advantages</a:t>
-            </a:r>
-          </a:p>
-          <a:p>
-            <a:pPr marL="1257300" lvl="2" indent="-342900">
-              <a:buFont typeface="Arial" panose="020B0604020202020204" pitchFamily="34" charset="0"/>
-              <a:buChar char="•"/>
-            </a:pPr>
-            <a:r>
-              <a:rPr lang="en-US" sz="2400" dirty="0">
-                <a:latin typeface="Source Sans Pro" panose="020B0503030403020204" pitchFamily="34" charset="0"/>
-                <a:ea typeface="Source Sans Pro" panose="020B0503030403020204" pitchFamily="34" charset="0"/>
-              </a:rPr>
-              <a:t>Compatible with the Arduino ecosystem</a:t>
-            </a:r>
-          </a:p>
-          <a:p>
-            <a:pPr marL="1257300" lvl="2" indent="-342900">
-              <a:buFont typeface="Arial" panose="020B0604020202020204" pitchFamily="34" charset="0"/>
-              <a:buChar char="•"/>
-            </a:pPr>
-            <a:r>
-              <a:rPr lang="en-US" sz="2400" dirty="0">
-                <a:latin typeface="Source Sans Pro" panose="020B0503030403020204" pitchFamily="34" charset="0"/>
-                <a:ea typeface="Source Sans Pro" panose="020B0503030403020204" pitchFamily="34" charset="0"/>
-              </a:rPr>
-              <a:t>Relatively fast hardware</a:t>
-            </a:r>
-          </a:p>
-          <a:p>
-            <a:pPr marL="800100" lvl="1" indent="-342900">
-              <a:buFont typeface="Arial" panose="020B0604020202020204" pitchFamily="34" charset="0"/>
-              <a:buChar char="•"/>
-            </a:pPr>
-            <a:r>
-              <a:rPr lang="en-US" sz="2400" dirty="0">
-                <a:latin typeface="Source Sans Pro" panose="020B0503030403020204" pitchFamily="34" charset="0"/>
-                <a:ea typeface="Source Sans Pro" panose="020B0503030403020204" pitchFamily="34" charset="0"/>
-              </a:rPr>
-              <a:t>Disadvantages</a:t>
-            </a:r>
-          </a:p>
-          <a:p>
-            <a:pPr marL="1257300" lvl="2" indent="-342900">
-              <a:buFont typeface="Arial" panose="020B0604020202020204" pitchFamily="34" charset="0"/>
-              <a:buChar char="•"/>
-            </a:pPr>
-            <a:r>
-              <a:rPr lang="en-US" sz="2400" dirty="0">
-                <a:latin typeface="Source Sans Pro" panose="020B0503030403020204" pitchFamily="34" charset="0"/>
-                <a:ea typeface="Source Sans Pro" panose="020B0503030403020204" pitchFamily="34" charset="0"/>
-              </a:rPr>
-              <a:t>Less documentation than name brand Arduino hardware</a:t>
-            </a:r>
-          </a:p>
-          <a:p>
-            <a:pPr marL="800100" lvl="1" indent="-342900">
-              <a:buFont typeface="Arial" panose="020B0604020202020204" pitchFamily="34" charset="0"/>
-              <a:buChar char="•"/>
-            </a:pPr>
-            <a:r>
-              <a:rPr lang="en-US" sz="2400" dirty="0">
-                <a:latin typeface="Source Sans Pro" panose="020B0503030403020204" pitchFamily="34" charset="0"/>
-                <a:ea typeface="Source Sans Pro" panose="020B0503030403020204" pitchFamily="34" charset="0"/>
-              </a:rPr>
-              <a:t>Workings</a:t>
-            </a:r>
-          </a:p>
-          <a:p>
-            <a:pPr marL="1257300" lvl="2" indent="-342900">
-              <a:buFont typeface="Arial" panose="020B0604020202020204" pitchFamily="34" charset="0"/>
-              <a:buChar char="•"/>
-            </a:pPr>
-            <a:r>
-              <a:rPr lang="en-US" sz="2400" dirty="0">
-                <a:latin typeface="Source Sans Pro" panose="020B0503030403020204" pitchFamily="34" charset="0"/>
-                <a:ea typeface="Source Sans Pro" panose="020B0503030403020204" pitchFamily="34" charset="0"/>
-              </a:rPr>
-              <a:t>The small development board consisted of a programmable micro-controller, a Wi-Fi/Bluetooth module and other features. Also included are many GPIO pins.</a:t>
-            </a:r>
-          </a:p>
-          <a:p>
-            <a:pPr marL="342900" indent="-342900">
-              <a:buFont typeface="Arial" panose="020B0604020202020204" pitchFamily="34" charset="0"/>
-              <a:buChar char="•"/>
-            </a:pPr>
-            <a:endParaRPr lang="en-US" sz="2400" dirty="0">
-              <a:latin typeface="Source Sans Pro" panose="020B0503030403020204" pitchFamily="34" charset="0"/>
-              <a:ea typeface="Source Sans Pro" panose="020B0503030403020204" pitchFamily="34" charset="0"/>
-            </a:endParaRPr>
-          </a:p>
-        </p:txBody>
-      </p:sp>
-      <p:sp>
-        <p:nvSpPr>
           <p:cNvPr id="46" name="TextBox 45">
             <a:extLst>
               <a:ext uri="{FF2B5EF4-FFF2-40B4-BE49-F238E27FC236}">
@@ -4190,7 +4082,7 @@
         <p:spPr>
           <a:xfrm>
             <a:off x="16293966" y="15657023"/>
-            <a:ext cx="6889203" cy="2308324"/>
+            <a:ext cx="6889203" cy="1938992"/>
           </a:xfrm>
           <a:prstGeom prst="rect">
             <a:avLst/>
@@ -4208,8 +4100,19 @@
                 <a:latin typeface="Source Sans Pro" panose="020B0503030403020204" pitchFamily="34" charset="0"/>
                 <a:ea typeface="Source Sans Pro" panose="020B0503030403020204" pitchFamily="34" charset="0"/>
               </a:rPr>
-              <a:t>With these parts on hand, I started doing some initial tests to familiarize myself with the display and how to drive it with the esp32. I wired the display to the esp32 as can be seen in the image to the left.  Some example code was uploaded to the esp32 to display some example images.</a:t>
-            </a:r>
+              <a:t>I started by doing some initial tests to familiarize myself with the display and how to drive it with the esp32. I wired the display to the esp32 as can be seen in the image to the left.  This allowed me to program </a:t>
+            </a:r>
+            <a:r>
+              <a:rPr lang="en-US" sz="2400">
+                <a:latin typeface="Source Sans Pro" panose="020B0503030403020204" pitchFamily="34" charset="0"/>
+                <a:ea typeface="Source Sans Pro" panose="020B0503030403020204" pitchFamily="34" charset="0"/>
+              </a:rPr>
+              <a:t>the display.</a:t>
+            </a:r>
+            <a:endParaRPr lang="en-US" sz="2400" dirty="0">
+              <a:latin typeface="Source Sans Pro" panose="020B0503030403020204" pitchFamily="34" charset="0"/>
+              <a:ea typeface="Source Sans Pro" panose="020B0503030403020204" pitchFamily="34" charset="0"/>
+            </a:endParaRPr>
           </a:p>
         </p:txBody>
       </p:sp>
@@ -4293,7 +4196,7 @@
                 <a:latin typeface="Source Sans Pro" panose="020B0503030403020204" pitchFamily="34" charset="0"/>
                 <a:ea typeface="Source Sans Pro" panose="020B0503030403020204" pitchFamily="34" charset="0"/>
               </a:rPr>
-              <a:t>After getting a foundation for how to program for and drive the display I started work on a frame to hold the display. I came up with a simple design using a computer aided design program called Fusion 360. The design can be seen below. I sent a dimension document to a machinist in the physics department, and he put together a metal construction of the frame.</a:t>
+              <a:t>Next, I started work on a frame to hold the display. I produced a simple design using a computer aided design program called Fusion 360. The design can be seen below. I sent a dimension document to a machinist in the physics department, and he put together a metal construction of the frame.</a:t>
             </a:r>
           </a:p>
         </p:txBody>
@@ -4360,7 +4263,7 @@
         <p:spPr>
           <a:xfrm>
             <a:off x="25290663" y="2880629"/>
-            <a:ext cx="8520370" cy="2677656"/>
+            <a:ext cx="7909260" cy="1938992"/>
           </a:xfrm>
           <a:prstGeom prst="rect">
             <a:avLst/>
@@ -4378,7 +4281,7 @@
                 <a:latin typeface="Source Sans Pro" panose="020B0503030403020204" pitchFamily="34" charset="0"/>
                 <a:ea typeface="Source Sans Pro" panose="020B0503030403020204" pitchFamily="34" charset="0"/>
               </a:rPr>
-              <a:t>Next, I started working on the software that would display the weather information. I stumbled upon a GitHub repository that had a well written script that was very close to the application that I was shooting for. I lightly modified the program to work for my situation and I now had a working weather clock, although it still had to be powered by cable and the circuitry was very messy and temporary.</a:t>
+              <a:t>The software was based upon a GitHub repository that had a well written script that was very close to the application that I was shooting for. With this I had a working weather display, but it still had to be powered by cable and the circuitry was very messy and temporary.</a:t>
             </a:r>
           </a:p>
         </p:txBody>
@@ -4445,7 +4348,7 @@
         <p:spPr>
           <a:xfrm>
             <a:off x="25290663" y="6796690"/>
-            <a:ext cx="12120700" cy="1938992"/>
+            <a:ext cx="12120700" cy="1200329"/>
           </a:xfrm>
           <a:prstGeom prst="rect">
             <a:avLst/>
@@ -4463,7 +4366,7 @@
                 <a:latin typeface="Source Sans Pro" panose="020B0503030403020204" pitchFamily="34" charset="0"/>
                 <a:ea typeface="Source Sans Pro" panose="020B0503030403020204" pitchFamily="34" charset="0"/>
               </a:rPr>
-              <a:t>I delved into learning electronic design automation (EDA) so that I could design a PCB to mount all my parts to. I went with a program called </a:t>
+              <a:t>I designed a PCB to mount all my parts to. I used a program called </a:t>
             </a:r>
             <a:r>
               <a:rPr lang="en-US" sz="2400" dirty="0" err="1">
@@ -4477,7 +4380,7 @@
                 <a:latin typeface="Source Sans Pro" panose="020B0503030403020204" pitchFamily="34" charset="0"/>
                 <a:ea typeface="Source Sans Pro" panose="020B0503030403020204" pitchFamily="34" charset="0"/>
               </a:rPr>
-              <a:t> and designed a board to mount right behind the display and connect everything together. The design can be seen below. I next sent my design to a PCB manufacturing company. This company cheaply produced a small batch of my board and shipped them to me.</a:t>
+              <a:t>. The design can be seen below. I next sent my design to a PCB manufacturing company. This company cheaply produced a small batch of my board and shipped them to me.</a:t>
             </a:r>
           </a:p>
         </p:txBody>
@@ -4543,8 +4446,8 @@
         </p:nvSpPr>
         <p:spPr>
           <a:xfrm>
-            <a:off x="25156203" y="13378677"/>
-            <a:ext cx="12120700" cy="830997"/>
+            <a:off x="30012602" y="13714782"/>
+            <a:ext cx="6725309" cy="1569660"/>
           </a:xfrm>
           <a:prstGeom prst="rect">
             <a:avLst/>
@@ -4681,7 +4584,7 @@
             <p:nvPr/>
           </p:nvPicPr>
           <p:blipFill>
-            <a:blip r:embed="rId5">
+            <a:blip r:embed="rId6">
               <a:extLst>
                 <a:ext uri="{28A0092B-C50C-407E-A947-70E740481C1C}">
                   <a14:useLocalDpi xmlns:a14="http://schemas.microsoft.com/office/drawing/2010/main" val="0"/>
@@ -4728,7 +4631,7 @@
             <p:nvPr/>
           </p:nvPicPr>
           <p:blipFill>
-            <a:blip r:embed="rId6">
+            <a:blip r:embed="rId7">
               <a:extLst>
                 <a:ext uri="{28A0092B-C50C-407E-A947-70E740481C1C}">
                   <a14:useLocalDpi xmlns:a14="http://schemas.microsoft.com/office/drawing/2010/main" val="0"/>
@@ -4775,7 +4678,7 @@
             <p:nvPr/>
           </p:nvPicPr>
           <p:blipFill>
-            <a:blip r:embed="rId7">
+            <a:blip r:embed="rId8">
               <a:extLst>
                 <a:ext uri="{28A0092B-C50C-407E-A947-70E740481C1C}">
                   <a14:useLocalDpi xmlns:a14="http://schemas.microsoft.com/office/drawing/2010/main" val="0"/>
@@ -4881,7 +4784,7 @@
             <p:nvPr/>
           </p:nvPicPr>
           <p:blipFill rotWithShape="1">
-            <a:blip r:embed="rId8">
+            <a:blip r:embed="rId9">
               <a:extLst>
                 <a:ext uri="{28A0092B-C50C-407E-A947-70E740481C1C}">
                   <a14:useLocalDpi xmlns:a14="http://schemas.microsoft.com/office/drawing/2010/main" val="0"/>
@@ -4978,8 +4881,8 @@
         </p:nvGrpSpPr>
         <p:grpSpPr>
           <a:xfrm>
-            <a:off x="19126198" y="5018151"/>
-            <a:ext cx="4400261" cy="3351864"/>
+            <a:off x="18220884" y="5018150"/>
+            <a:ext cx="5305576" cy="4041481"/>
             <a:chOff x="19126198" y="5018151"/>
             <a:chExt cx="4400261" cy="3351864"/>
           </a:xfrm>
@@ -4999,7 +4902,7 @@
             <p:nvPr/>
           </p:nvPicPr>
           <p:blipFill>
-            <a:blip r:embed="rId9">
+            <a:blip r:embed="rId10">
               <a:extLst>
                 <a:ext uri="{28A0092B-C50C-407E-A947-70E740481C1C}">
                   <a14:useLocalDpi xmlns:a14="http://schemas.microsoft.com/office/drawing/2010/main" val="0"/>
@@ -5084,8 +4987,8 @@
         </p:nvGrpSpPr>
         <p:grpSpPr>
           <a:xfrm>
-            <a:off x="19137417" y="8656100"/>
-            <a:ext cx="4400260" cy="3522066"/>
+            <a:off x="18184566" y="9687438"/>
+            <a:ext cx="5220439" cy="4178555"/>
             <a:chOff x="19137417" y="8656100"/>
             <a:chExt cx="4400260" cy="3522066"/>
           </a:xfrm>
@@ -5105,7 +5008,7 @@
             <p:nvPr/>
           </p:nvPicPr>
           <p:blipFill>
-            <a:blip r:embed="rId10">
+            <a:blip r:embed="rId11">
               <a:extLst>
                 <a:ext uri="{28A0092B-C50C-407E-A947-70E740481C1C}">
                   <a14:useLocalDpi xmlns:a14="http://schemas.microsoft.com/office/drawing/2010/main" val="0"/>
@@ -5315,7 +5218,7 @@
         </p:nvGrpSpPr>
         <p:grpSpPr>
           <a:xfrm>
-            <a:off x="25461526" y="9000239"/>
+            <a:off x="25461526" y="8671995"/>
             <a:ext cx="6048376" cy="3531797"/>
             <a:chOff x="25461526" y="9000239"/>
             <a:chExt cx="6048376" cy="3531797"/>
@@ -5336,7 +5239,7 @@
             <p:nvPr/>
           </p:nvPicPr>
           <p:blipFill>
-            <a:blip r:embed="rId11">
+            <a:blip r:embed="rId12">
               <a:extLst>
                 <a:ext uri="{28A0092B-C50C-407E-A947-70E740481C1C}">
                   <a14:useLocalDpi xmlns:a14="http://schemas.microsoft.com/office/drawing/2010/main" val="0"/>
@@ -5432,7 +5335,7 @@
         </p:nvGrpSpPr>
         <p:grpSpPr>
           <a:xfrm>
-            <a:off x="34057638" y="2834997"/>
+            <a:off x="33567403" y="2877757"/>
             <a:ext cx="3177800" cy="2899803"/>
             <a:chOff x="34057638" y="2834997"/>
             <a:chExt cx="3177800" cy="2899803"/>
@@ -5453,7 +5356,7 @@
             <p:nvPr/>
           </p:nvPicPr>
           <p:blipFill>
-            <a:blip r:embed="rId12">
+            <a:blip r:embed="rId13">
               <a:extLst>
                 <a:ext uri="{28A0092B-C50C-407E-A947-70E740481C1C}">
                   <a14:useLocalDpi xmlns:a14="http://schemas.microsoft.com/office/drawing/2010/main" val="0"/>
@@ -5538,7 +5441,7 @@
         </p:nvGrpSpPr>
         <p:grpSpPr>
           <a:xfrm>
-            <a:off x="32193566" y="8999998"/>
+            <a:off x="32193566" y="8695200"/>
             <a:ext cx="4544356" cy="3495698"/>
             <a:chOff x="32193566" y="8999998"/>
             <a:chExt cx="4544356" cy="3495698"/>
@@ -5559,7 +5462,7 @@
             <p:nvPr/>
           </p:nvPicPr>
           <p:blipFill rotWithShape="1">
-            <a:blip r:embed="rId13">
+            <a:blip r:embed="rId14">
               <a:extLst>
                 <a:ext uri="{28A0092B-C50C-407E-A947-70E740481C1C}">
                   <a14:useLocalDpi xmlns:a14="http://schemas.microsoft.com/office/drawing/2010/main" val="0"/>
@@ -5642,7 +5545,7 @@
         </p:nvGrpSpPr>
         <p:grpSpPr>
           <a:xfrm>
-            <a:off x="25291701" y="14335359"/>
+            <a:off x="25380562" y="13617865"/>
             <a:ext cx="4632040" cy="3473960"/>
             <a:chOff x="25291701" y="14335359"/>
             <a:chExt cx="4632040" cy="3473960"/>
@@ -5663,7 +5566,7 @@
             <p:nvPr/>
           </p:nvPicPr>
           <p:blipFill>
-            <a:blip r:embed="rId14">
+            <a:blip r:embed="rId15">
               <a:extLst>
                 <a:ext uri="{28A0092B-C50C-407E-A947-70E740481C1C}">
                   <a14:useLocalDpi xmlns:a14="http://schemas.microsoft.com/office/drawing/2010/main" val="0"/>
@@ -5736,112 +5639,6 @@
       </p:grpSp>
       <p:grpSp>
         <p:nvGrpSpPr>
-          <p:cNvPr id="23" name="Group 22">
-            <a:extLst>
-              <a:ext uri="{FF2B5EF4-FFF2-40B4-BE49-F238E27FC236}">
-                <a16:creationId xmlns:a16="http://schemas.microsoft.com/office/drawing/2014/main" id="{9E3D91B3-4708-48F1-9024-654F4FFA7D4E}"/>
-              </a:ext>
-            </a:extLst>
-          </p:cNvPr>
-          <p:cNvGrpSpPr/>
-          <p:nvPr/>
-        </p:nvGrpSpPr>
-        <p:grpSpPr>
-          <a:xfrm>
-            <a:off x="29521553" y="14462840"/>
-            <a:ext cx="7019925" cy="3229760"/>
-            <a:chOff x="29521553" y="14462840"/>
-            <a:chExt cx="7019925" cy="3229760"/>
-          </a:xfrm>
-        </p:grpSpPr>
-        <p:pic>
-          <p:nvPicPr>
-            <p:cNvPr id="1062" name="Picture 38">
-              <a:extLst>
-                <a:ext uri="{FF2B5EF4-FFF2-40B4-BE49-F238E27FC236}">
-                  <a16:creationId xmlns:a16="http://schemas.microsoft.com/office/drawing/2014/main" id="{674BC305-66A5-4DCE-A304-FD941AF3B594}"/>
-                </a:ext>
-              </a:extLst>
-            </p:cNvPr>
-            <p:cNvPicPr>
-              <a:picLocks noChangeAspect="1" noChangeArrowheads="1"/>
-            </p:cNvPicPr>
-            <p:nvPr/>
-          </p:nvPicPr>
-          <p:blipFill>
-            <a:blip r:embed="rId15">
-              <a:extLst>
-                <a:ext uri="{28A0092B-C50C-407E-A947-70E740481C1C}">
-                  <a14:useLocalDpi xmlns:a14="http://schemas.microsoft.com/office/drawing/2010/main" val="0"/>
-                </a:ext>
-              </a:extLst>
-            </a:blip>
-            <a:srcRect/>
-            <a:stretch>
-              <a:fillRect/>
-            </a:stretch>
-          </p:blipFill>
-          <p:spPr bwMode="auto">
-            <a:xfrm>
-              <a:off x="29521553" y="14462840"/>
-              <a:ext cx="7019925" cy="2447925"/>
-            </a:xfrm>
-            <a:prstGeom prst="rect">
-              <a:avLst/>
-            </a:prstGeom>
-            <a:noFill/>
-            <a:extLst>
-              <a:ext uri="{909E8E84-426E-40DD-AFC4-6F175D3DCCD1}">
-                <a14:hiddenFill xmlns:a14="http://schemas.microsoft.com/office/drawing/2010/main">
-                  <a:solidFill>
-                    <a:srgbClr val="FFFFFF"/>
-                  </a:solidFill>
-                </a14:hiddenFill>
-              </a:ext>
-            </a:extLst>
-          </p:spPr>
-        </p:pic>
-        <p:sp>
-          <p:nvSpPr>
-            <p:cNvPr id="74" name="TextBox 73">
-              <a:extLst>
-                <a:ext uri="{FF2B5EF4-FFF2-40B4-BE49-F238E27FC236}">
-                  <a16:creationId xmlns:a16="http://schemas.microsoft.com/office/drawing/2014/main" id="{B63CB55E-66D6-4354-A4F5-0A8F888F9340}"/>
-                </a:ext>
-              </a:extLst>
-            </p:cNvPr>
-            <p:cNvSpPr txBox="1"/>
-            <p:nvPr/>
-          </p:nvSpPr>
-          <p:spPr>
-            <a:xfrm>
-              <a:off x="30621156" y="17046269"/>
-              <a:ext cx="5124264" cy="646331"/>
-            </a:xfrm>
-            <a:prstGeom prst="rect">
-              <a:avLst/>
-            </a:prstGeom>
-            <a:noFill/>
-          </p:spPr>
-          <p:txBody>
-            <a:bodyPr wrap="square" rtlCol="0">
-              <a:spAutoFit/>
-            </a:bodyPr>
-            <a:lstStyle/>
-            <a:p>
-              <a:r>
-                <a:rPr lang="en-US" dirty="0">
-                  <a:latin typeface="Source Sans Pro" panose="020B0503030403020204" pitchFamily="34" charset="0"/>
-                  <a:ea typeface="Source Sans Pro" panose="020B0503030403020204" pitchFamily="34" charset="0"/>
-                </a:rPr>
-                <a:t>FIG. 12. Block diagram of Weather Clock components</a:t>
-              </a:r>
-            </a:p>
-          </p:txBody>
-        </p:sp>
-      </p:grpSp>
-      <p:grpSp>
-        <p:nvGrpSpPr>
           <p:cNvPr id="25" name="Group 24">
             <a:extLst>
               <a:ext uri="{FF2B5EF4-FFF2-40B4-BE49-F238E27FC236}">
@@ -5854,7 +5651,7 @@
         </p:nvGrpSpPr>
         <p:grpSpPr>
           <a:xfrm>
-            <a:off x="25290663" y="17852399"/>
+            <a:off x="32840283" y="17422831"/>
             <a:ext cx="4632040" cy="3545152"/>
             <a:chOff x="25290663" y="17852399"/>
             <a:chExt cx="4632040" cy="3545152"/>
@@ -5960,8 +5757,8 @@
         </p:nvGrpSpPr>
         <p:grpSpPr>
           <a:xfrm>
-            <a:off x="30310173" y="17852399"/>
-            <a:ext cx="5943601" cy="3144222"/>
+            <a:off x="25461526" y="17478549"/>
+            <a:ext cx="6995054" cy="3700451"/>
             <a:chOff x="30310173" y="17852399"/>
             <a:chExt cx="5943601" cy="3144222"/>
           </a:xfrm>

</xml_diff>